<commit_message>
Adicionado o Processo de Chaos Engineering
</commit_message>
<xml_diff>
--- a/docs/Conhecendo Chaos Engineering.pptx
+++ b/docs/Conhecendo Chaos Engineering.pptx
@@ -8311,7 +8311,7 @@
                 <a16:creationId xmlns:a16="http://schemas.microsoft.com/office/drawing/2014/main" id="{AC3E6C53-102E-4ACA-BCBB-3CC973B99486}"/>
               </a:ext>
               <a:ext uri="{C183D7F6-B498-43B3-948B-1728B52AA6E4}">
-                <adec:decorative xmlns:adec="http://schemas.microsoft.com/office/drawing/2017/decorative" xmlns="" val="1"/>
+                <adec:decorative xmlns="" xmlns:adec="http://schemas.microsoft.com/office/drawing/2017/decorative" val="1"/>
               </a:ext>
             </a:extLst>
           </p:cNvPr>
@@ -8357,7 +8357,7 @@
                 <a16:creationId xmlns:a16="http://schemas.microsoft.com/office/drawing/2014/main" id="{17B2B42C-0777-4D6E-9432-535281803A88}"/>
               </a:ext>
               <a:ext uri="{C183D7F6-B498-43B3-948B-1728B52AA6E4}">
-                <adec:decorative xmlns:adec="http://schemas.microsoft.com/office/drawing/2017/decorative" xmlns="" val="1"/>
+                <adec:decorative xmlns="" xmlns:adec="http://schemas.microsoft.com/office/drawing/2017/decorative" val="1"/>
               </a:ext>
             </a:extLst>
           </p:cNvPr>
@@ -8402,7 +8402,7 @@
                 <a16:creationId xmlns:a16="http://schemas.microsoft.com/office/drawing/2014/main" id="{EFEAAB60-93E2-4DC6-99AC-939637BCE864}"/>
               </a:ext>
               <a:ext uri="{C183D7F6-B498-43B3-948B-1728B52AA6E4}">
-                <adec:decorative xmlns:adec="http://schemas.microsoft.com/office/drawing/2017/decorative" xmlns="" val="1"/>
+                <adec:decorative xmlns="" xmlns:adec="http://schemas.microsoft.com/office/drawing/2017/decorative" val="1"/>
               </a:ext>
             </a:extLst>
           </p:cNvPr>
@@ -8447,7 +8447,7 @@
                 <a16:creationId xmlns:a16="http://schemas.microsoft.com/office/drawing/2014/main" id="{7EF5ECB8-D49C-48FB-A93E-88EB2FFDFD42}"/>
               </a:ext>
               <a:ext uri="{C183D7F6-B498-43B3-948B-1728B52AA6E4}">
-                <adec:decorative xmlns:adec="http://schemas.microsoft.com/office/drawing/2017/decorative" xmlns="" val="1"/>
+                <adec:decorative xmlns="" xmlns:adec="http://schemas.microsoft.com/office/drawing/2017/decorative" val="1"/>
               </a:ext>
             </a:extLst>
           </p:cNvPr>
@@ -8505,7 +8505,7 @@
                 <a16:creationId xmlns:a16="http://schemas.microsoft.com/office/drawing/2014/main" id="{411B77A2-BD5C-432D-B52E-C12612C74C17}"/>
               </a:ext>
               <a:ext uri="{C183D7F6-B498-43B3-948B-1728B52AA6E4}">
-                <adec:decorative xmlns:adec="http://schemas.microsoft.com/office/drawing/2017/decorative" xmlns="" val="1"/>
+                <adec:decorative xmlns="" xmlns:adec="http://schemas.microsoft.com/office/drawing/2017/decorative" val="1"/>
               </a:ext>
             </a:extLst>
           </p:cNvPr>
@@ -8560,7 +8560,7 @@
                 <a16:creationId xmlns:a16="http://schemas.microsoft.com/office/drawing/2014/main" id="{B5C18694-F55B-41C0-ABF3-C1D971F99ADB}"/>
               </a:ext>
               <a:ext uri="{C183D7F6-B498-43B3-948B-1728B52AA6E4}">
-                <adec:decorative xmlns:adec="http://schemas.microsoft.com/office/drawing/2017/decorative" xmlns="" val="1"/>
+                <adec:decorative xmlns="" xmlns:adec="http://schemas.microsoft.com/office/drawing/2017/decorative" val="1"/>
               </a:ext>
             </a:extLst>
           </p:cNvPr>
@@ -8620,7 +8620,7 @@
                 <a16:creationId xmlns:a16="http://schemas.microsoft.com/office/drawing/2014/main" id="{E3E46CA8-7278-4BA3-AACE-235B5B3B53E0}"/>
               </a:ext>
               <a:ext uri="{C183D7F6-B498-43B3-948B-1728B52AA6E4}">
-                <adec:decorative xmlns:adec="http://schemas.microsoft.com/office/drawing/2017/decorative" xmlns="" val="1"/>
+                <adec:decorative xmlns="" xmlns:adec="http://schemas.microsoft.com/office/drawing/2017/decorative" val="1"/>
               </a:ext>
             </a:extLst>
           </p:cNvPr>
@@ -8902,7 +8902,7 @@
                 <a16:creationId xmlns:a16="http://schemas.microsoft.com/office/drawing/2014/main" id="{AC3E6C53-102E-4ACA-BCBB-3CC973B99486}"/>
               </a:ext>
               <a:ext uri="{C183D7F6-B498-43B3-948B-1728B52AA6E4}">
-                <adec:decorative xmlns:adec="http://schemas.microsoft.com/office/drawing/2017/decorative" xmlns="" val="1"/>
+                <adec:decorative xmlns="" xmlns:adec="http://schemas.microsoft.com/office/drawing/2017/decorative" val="1"/>
               </a:ext>
             </a:extLst>
           </p:cNvPr>
@@ -8948,7 +8948,7 @@
                 <a16:creationId xmlns:a16="http://schemas.microsoft.com/office/drawing/2014/main" id="{17B2B42C-0777-4D6E-9432-535281803A88}"/>
               </a:ext>
               <a:ext uri="{C183D7F6-B498-43B3-948B-1728B52AA6E4}">
-                <adec:decorative xmlns:adec="http://schemas.microsoft.com/office/drawing/2017/decorative" xmlns="" val="1"/>
+                <adec:decorative xmlns="" xmlns:adec="http://schemas.microsoft.com/office/drawing/2017/decorative" val="1"/>
               </a:ext>
             </a:extLst>
           </p:cNvPr>
@@ -8993,7 +8993,7 @@
                 <a16:creationId xmlns:a16="http://schemas.microsoft.com/office/drawing/2014/main" id="{EFEAAB60-93E2-4DC6-99AC-939637BCE864}"/>
               </a:ext>
               <a:ext uri="{C183D7F6-B498-43B3-948B-1728B52AA6E4}">
-                <adec:decorative xmlns:adec="http://schemas.microsoft.com/office/drawing/2017/decorative" xmlns="" val="1"/>
+                <adec:decorative xmlns="" xmlns:adec="http://schemas.microsoft.com/office/drawing/2017/decorative" val="1"/>
               </a:ext>
             </a:extLst>
           </p:cNvPr>
@@ -9038,7 +9038,7 @@
                 <a16:creationId xmlns:a16="http://schemas.microsoft.com/office/drawing/2014/main" id="{7EF5ECB8-D49C-48FB-A93E-88EB2FFDFD42}"/>
               </a:ext>
               <a:ext uri="{C183D7F6-B498-43B3-948B-1728B52AA6E4}">
-                <adec:decorative xmlns:adec="http://schemas.microsoft.com/office/drawing/2017/decorative" xmlns="" val="1"/>
+                <adec:decorative xmlns="" xmlns:adec="http://schemas.microsoft.com/office/drawing/2017/decorative" val="1"/>
               </a:ext>
             </a:extLst>
           </p:cNvPr>
@@ -9096,7 +9096,7 @@
                 <a16:creationId xmlns:a16="http://schemas.microsoft.com/office/drawing/2014/main" id="{411B77A2-BD5C-432D-B52E-C12612C74C17}"/>
               </a:ext>
               <a:ext uri="{C183D7F6-B498-43B3-948B-1728B52AA6E4}">
-                <adec:decorative xmlns:adec="http://schemas.microsoft.com/office/drawing/2017/decorative" xmlns="" val="1"/>
+                <adec:decorative xmlns="" xmlns:adec="http://schemas.microsoft.com/office/drawing/2017/decorative" val="1"/>
               </a:ext>
             </a:extLst>
           </p:cNvPr>
@@ -9151,7 +9151,7 @@
                 <a16:creationId xmlns:a16="http://schemas.microsoft.com/office/drawing/2014/main" id="{B5C18694-F55B-41C0-ABF3-C1D971F99ADB}"/>
               </a:ext>
               <a:ext uri="{C183D7F6-B498-43B3-948B-1728B52AA6E4}">
-                <adec:decorative xmlns:adec="http://schemas.microsoft.com/office/drawing/2017/decorative" xmlns="" val="1"/>
+                <adec:decorative xmlns="" xmlns:adec="http://schemas.microsoft.com/office/drawing/2017/decorative" val="1"/>
               </a:ext>
             </a:extLst>
           </p:cNvPr>
@@ -9211,7 +9211,7 @@
                 <a16:creationId xmlns:a16="http://schemas.microsoft.com/office/drawing/2014/main" id="{E3E46CA8-7278-4BA3-AACE-235B5B3B53E0}"/>
               </a:ext>
               <a:ext uri="{C183D7F6-B498-43B3-948B-1728B52AA6E4}">
-                <adec:decorative xmlns:adec="http://schemas.microsoft.com/office/drawing/2017/decorative" xmlns="" val="1"/>
+                <adec:decorative xmlns="" xmlns:adec="http://schemas.microsoft.com/office/drawing/2017/decorative" val="1"/>
               </a:ext>
             </a:extLst>
           </p:cNvPr>
@@ -9949,11 +9949,7 @@
           <a:p>
             <a:r>
               <a:rPr lang="pt-BR" sz="2800" dirty="0" smtClean="0"/>
-              <a:t>Engenheiros do caos</a:t>
-            </a:r>
-            <a:r>
-              <a:rPr lang="pt-BR" sz="2800" dirty="0" smtClean="0"/>
-              <a:t> auxiliam as equipes de produção a não ignorarem esse ambiente hostil.</a:t>
+              <a:t>Engenheiros do caos auxiliam as equipes de produção a não ignorarem esse ambiente hostil.</a:t>
             </a:r>
           </a:p>
           <a:p>
@@ -10040,10 +10036,76 @@
           <a:bodyPr/>
           <a:lstStyle/>
           <a:p>
+            <a:r>
+              <a:rPr lang="pt-BR" dirty="0" smtClean="0"/>
+              <a:t>Como o sistema responderá a uma situação </a:t>
+            </a:r>
+            <a:r>
+              <a:rPr lang="pt-BR" dirty="0" smtClean="0"/>
+              <a:t>x?</a:t>
+            </a:r>
+            <a:endParaRPr lang="pt-BR" dirty="0" smtClean="0"/>
+          </a:p>
+          <a:p>
+            <a:r>
+              <a:rPr lang="pt-BR" dirty="0" smtClean="0"/>
+              <a:t>A questão leva ao risco a ser explorado.</a:t>
+            </a:r>
+          </a:p>
+          <a:p>
+            <a:r>
+              <a:rPr lang="pt-BR" dirty="0" smtClean="0"/>
+              <a:t>O risco leva a uma hipótese</a:t>
+            </a:r>
+          </a:p>
+          <a:p>
+            <a:r>
+              <a:rPr lang="pt-BR" dirty="0" smtClean="0"/>
+              <a:t>A hipótese leva a observação</a:t>
+            </a:r>
+          </a:p>
+          <a:p>
+            <a:r>
+              <a:rPr lang="pt-BR" dirty="0" smtClean="0"/>
+              <a:t>A observação leva a correção de erros ou comprovação de </a:t>
+            </a:r>
+            <a:br>
+              <a:rPr lang="pt-BR" dirty="0" smtClean="0"/>
+            </a:br>
+            <a:r>
+              <a:rPr lang="pt-BR" dirty="0" smtClean="0"/>
+              <a:t>confiabilidade do sistema.</a:t>
+            </a:r>
+          </a:p>
+          <a:p>
             <a:endParaRPr lang="pt-BR" dirty="0"/>
           </a:p>
         </p:txBody>
       </p:sp>
+      <p:pic>
+        <p:nvPicPr>
+          <p:cNvPr id="5" name="Imagem 4"/>
+          <p:cNvPicPr>
+            <a:picLocks noChangeAspect="1"/>
+          </p:cNvPicPr>
+          <p:nvPr/>
+        </p:nvPicPr>
+        <p:blipFill>
+          <a:blip r:embed="rId2"/>
+          <a:stretch>
+            <a:fillRect/>
+          </a:stretch>
+        </p:blipFill>
+        <p:spPr>
+          <a:xfrm>
+            <a:off x="2711494" y="5087711"/>
+            <a:ext cx="6429375" cy="1247775"/>
+          </a:xfrm>
+          <a:prstGeom prst="rect">
+            <a:avLst/>
+          </a:prstGeom>
+        </p:spPr>
+      </p:pic>
     </p:spTree>
     <p:extLst>
       <p:ext uri="{BB962C8B-B14F-4D97-AF65-F5344CB8AC3E}">

</xml_diff>